<commit_message>
Added placeholder for EDA part and introduced the EDA and Feature Engineering approach
</commit_message>
<xml_diff>
--- a/ATW_APT_Presentation/EDA-Presentation.pptx
+++ b/ATW_APT_Presentation/EDA-Presentation.pptx
@@ -5,7 +5,7 @@
     <p:sldMasterId id="2147483648" r:id="rId1"/>
   </p:sldMasterIdLst>
   <p:notesMasterIdLst>
-    <p:notesMasterId r:id="rId14"/>
+    <p:notesMasterId r:id="rId16"/>
   </p:notesMasterIdLst>
   <p:sldIdLst>
     <p:sldId id="256" r:id="rId2"/>
@@ -17,9 +17,11 @@
     <p:sldId id="267" r:id="rId8"/>
     <p:sldId id="266" r:id="rId9"/>
     <p:sldId id="268" r:id="rId10"/>
-    <p:sldId id="261" r:id="rId11"/>
-    <p:sldId id="265" r:id="rId12"/>
-    <p:sldId id="262" r:id="rId13"/>
+    <p:sldId id="269" r:id="rId11"/>
+    <p:sldId id="270" r:id="rId12"/>
+    <p:sldId id="261" r:id="rId13"/>
+    <p:sldId id="265" r:id="rId14"/>
+    <p:sldId id="262" r:id="rId15"/>
   </p:sldIdLst>
   <p:sldSz cx="12192000" cy="6858000"/>
   <p:notesSz cx="6858000" cy="9144000"/>
@@ -624,7 +626,91 @@
           <a:p>
             <a:fld id="{F0941BCE-09AA-FC4D-BB53-4ABA386CD2BE}" type="slidenum">
               <a:rPr lang="en-US" smtClean="0"/>
-              <a:t>11</a:t>
+              <a:t>12</a:t>
+            </a:fld>
+            <a:endParaRPr lang="en-US"/>
+          </a:p>
+        </p:txBody>
+      </p:sp>
+    </p:spTree>
+    <p:extLst>
+      <p:ext uri="{BB962C8B-B14F-4D97-AF65-F5344CB8AC3E}">
+        <p14:creationId xmlns:p14="http://schemas.microsoft.com/office/powerpoint/2010/main" val="2369507233"/>
+      </p:ext>
+    </p:extLst>
+  </p:cSld>
+  <p:clrMapOvr>
+    <a:masterClrMapping/>
+  </p:clrMapOvr>
+</p:notes>
+</file>
+
+<file path=ppt/notesSlides/notesSlide11.xml><?xml version="1.0" encoding="utf-8"?>
+<p:notes xmlns:a="http://schemas.openxmlformats.org/drawingml/2006/main" xmlns:r="http://schemas.openxmlformats.org/officeDocument/2006/relationships" xmlns:p="http://schemas.openxmlformats.org/presentationml/2006/main">
+  <p:cSld>
+    <p:spTree>
+      <p:nvGrpSpPr>
+        <p:cNvPr id="1" name=""/>
+        <p:cNvGrpSpPr/>
+        <p:nvPr/>
+      </p:nvGrpSpPr>
+      <p:grpSpPr>
+        <a:xfrm>
+          <a:off x="0" y="0"/>
+          <a:ext cx="0" cy="0"/>
+          <a:chOff x="0" y="0"/>
+          <a:chExt cx="0" cy="0"/>
+        </a:xfrm>
+      </p:grpSpPr>
+      <p:sp>
+        <p:nvSpPr>
+          <p:cNvPr id="2" name="Slide Image Placeholder 1"/>
+          <p:cNvSpPr>
+            <a:spLocks noGrp="1" noRot="1" noChangeAspect="1"/>
+          </p:cNvSpPr>
+          <p:nvPr>
+            <p:ph type="sldImg"/>
+          </p:nvPr>
+        </p:nvSpPr>
+        <p:spPr/>
+      </p:sp>
+      <p:sp>
+        <p:nvSpPr>
+          <p:cNvPr id="3" name="Notes Placeholder 2"/>
+          <p:cNvSpPr>
+            <a:spLocks noGrp="1"/>
+          </p:cNvSpPr>
+          <p:nvPr>
+            <p:ph type="body" idx="1"/>
+          </p:nvPr>
+        </p:nvSpPr>
+        <p:spPr/>
+        <p:txBody>
+          <a:bodyPr/>
+          <a:lstStyle/>
+          <a:p>
+            <a:endParaRPr lang="en-US" dirty="0"/>
+          </a:p>
+        </p:txBody>
+      </p:sp>
+      <p:sp>
+        <p:nvSpPr>
+          <p:cNvPr id="4" name="Slide Number Placeholder 3"/>
+          <p:cNvSpPr>
+            <a:spLocks noGrp="1"/>
+          </p:cNvSpPr>
+          <p:nvPr>
+            <p:ph type="sldNum" sz="quarter" idx="5"/>
+          </p:nvPr>
+        </p:nvSpPr>
+        <p:spPr/>
+        <p:txBody>
+          <a:bodyPr/>
+          <a:lstStyle/>
+          <a:p>
+            <a:fld id="{F0941BCE-09AA-FC4D-BB53-4ABA386CD2BE}" type="slidenum">
+              <a:rPr lang="en-US" smtClean="0"/>
+              <a:t>13</a:t>
             </a:fld>
             <a:endParaRPr lang="en-US"/>
           </a:p>
@@ -1399,7 +1485,7 @@
               <a:t>interpreteren</a:t>
             </a:r>
             <a:r>
-              <a:rPr lang="en-US"/>
+              <a:rPr lang="en-US" dirty="0"/>
               <a:t>?</a:t>
             </a:r>
           </a:p>
@@ -1485,6 +1571,129 @@
           <a:bodyPr/>
           <a:lstStyle/>
           <a:p>
+            <a:pPr marL="0" marR="0" lvl="0" indent="0" algn="l" defTabSz="914400" rtl="0" eaLnBrk="1" fontAlgn="auto" latinLnBrk="0" hangingPunct="1">
+              <a:lnSpc>
+                <a:spcPct val="100000"/>
+              </a:lnSpc>
+              <a:spcBef>
+                <a:spcPts val="0"/>
+              </a:spcBef>
+              <a:spcAft>
+                <a:spcPts val="0"/>
+              </a:spcAft>
+              <a:buClrTx/>
+              <a:buSzTx/>
+              <a:buFontTx/>
+              <a:buNone/>
+              <a:tabLst/>
+              <a:defRPr/>
+            </a:pPr>
+            <a:r>
+              <a:rPr lang="en-US" dirty="0" err="1"/>
+              <a:t>Meneer</a:t>
+            </a:r>
+            <a:r>
+              <a:rPr lang="en-US" dirty="0"/>
+              <a:t> Dijk </a:t>
+            </a:r>
+            <a:r>
+              <a:rPr lang="en-US" dirty="0" err="1"/>
+              <a:t>gebruikt</a:t>
+            </a:r>
+            <a:r>
+              <a:rPr lang="en-US" dirty="0"/>
+              <a:t> </a:t>
+            </a:r>
+            <a:r>
+              <a:rPr lang="en-US" dirty="0" err="1"/>
+              <a:t>ook</a:t>
+            </a:r>
+            <a:r>
+              <a:rPr lang="en-US" dirty="0"/>
+              <a:t> </a:t>
+            </a:r>
+            <a:r>
+              <a:rPr lang="en-US" dirty="0" err="1"/>
+              <a:t>een</a:t>
+            </a:r>
+            <a:r>
+              <a:rPr lang="en-US" dirty="0"/>
+              <a:t> Receiver operating characteristic curve (ROC curve) om </a:t>
+            </a:r>
+            <a:r>
+              <a:rPr lang="en-US" dirty="0" err="1"/>
+              <a:t>zijn</a:t>
+            </a:r>
+            <a:r>
+              <a:rPr lang="en-US" dirty="0"/>
+              <a:t> </a:t>
+            </a:r>
+            <a:r>
+              <a:rPr lang="en-US" dirty="0" err="1"/>
+              <a:t>aanpassingen</a:t>
+            </a:r>
+            <a:r>
+              <a:rPr lang="en-US" dirty="0"/>
+              <a:t> </a:t>
+            </a:r>
+            <a:r>
+              <a:rPr lang="en-US" dirty="0" err="1"/>
+              <a:t>te</a:t>
+            </a:r>
+            <a:r>
+              <a:rPr lang="en-US" dirty="0"/>
+              <a:t> </a:t>
+            </a:r>
+            <a:r>
+              <a:rPr lang="en-US" dirty="0" err="1"/>
+              <a:t>beoordelen</a:t>
+            </a:r>
+            <a:r>
+              <a:rPr lang="en-US" dirty="0"/>
+              <a:t>.</a:t>
+            </a:r>
+            <a:br>
+              <a:rPr lang="en-US" dirty="0"/>
+            </a:br>
+            <a:r>
+              <a:rPr lang="en-US" dirty="0"/>
+              <a:t>Wat </a:t>
+            </a:r>
+            <a:r>
+              <a:rPr lang="en-US" dirty="0" err="1"/>
+              <a:t>zeggen</a:t>
+            </a:r>
+            <a:r>
+              <a:rPr lang="en-US" dirty="0"/>
+              <a:t> </a:t>
+            </a:r>
+            <a:r>
+              <a:rPr lang="en-US" dirty="0" err="1"/>
+              <a:t>deze</a:t>
+            </a:r>
+            <a:r>
+              <a:rPr lang="en-US" dirty="0"/>
+              <a:t> curves?</a:t>
+            </a:r>
+          </a:p>
+          <a:p>
+            <a:pPr marL="0" marR="0" lvl="0" indent="0" algn="l" defTabSz="914400" rtl="0" eaLnBrk="1" fontAlgn="auto" latinLnBrk="0" hangingPunct="1">
+              <a:lnSpc>
+                <a:spcPct val="100000"/>
+              </a:lnSpc>
+              <a:spcBef>
+                <a:spcPts val="0"/>
+              </a:spcBef>
+              <a:spcAft>
+                <a:spcPts val="0"/>
+              </a:spcAft>
+              <a:buClrTx/>
+              <a:buSzTx/>
+              <a:buFontTx/>
+              <a:buNone/>
+              <a:tabLst/>
+              <a:defRPr/>
+            </a:pPr>
             <a:endParaRPr lang="en-US" dirty="0"/>
           </a:p>
         </p:txBody>
@@ -1569,7 +1778,78 @@
           <a:bodyPr/>
           <a:lstStyle/>
           <a:p>
-            <a:endParaRPr lang="en-US" dirty="0"/>
+            <a:r>
+              <a:rPr lang="en-US" dirty="0" err="1"/>
+              <a:t>Alleen</a:t>
+            </a:r>
+            <a:r>
+              <a:rPr lang="en-US" dirty="0"/>
+              <a:t> </a:t>
+            </a:r>
+            <a:r>
+              <a:rPr lang="en-US" dirty="0" err="1"/>
+              <a:t>bij</a:t>
+            </a:r>
+            <a:r>
+              <a:rPr lang="en-US" dirty="0"/>
+              <a:t> Reconnaissance </a:t>
+            </a:r>
+            <a:r>
+              <a:rPr lang="en-US" dirty="0" err="1"/>
+              <a:t>en</a:t>
+            </a:r>
+            <a:r>
+              <a:rPr lang="en-US" dirty="0"/>
+              <a:t> Establish Foothold </a:t>
+            </a:r>
+            <a:r>
+              <a:rPr lang="en-US" dirty="0" err="1"/>
+              <a:t>fase</a:t>
+            </a:r>
+            <a:r>
+              <a:rPr lang="en-US" dirty="0"/>
+              <a:t> </a:t>
+            </a:r>
+            <a:r>
+              <a:rPr lang="en-US" dirty="0" err="1"/>
+              <a:t>doet</a:t>
+            </a:r>
+            <a:r>
+              <a:rPr lang="en-US" dirty="0"/>
+              <a:t> de IDP </a:t>
+            </a:r>
+            <a:r>
+              <a:rPr lang="en-US" dirty="0" err="1"/>
+              <a:t>voorspeller</a:t>
+            </a:r>
+            <a:r>
+              <a:rPr lang="en-US" dirty="0"/>
+              <a:t> het </a:t>
+            </a:r>
+            <a:r>
+              <a:rPr lang="en-US" dirty="0" err="1"/>
+              <a:t>beter</a:t>
+            </a:r>
+            <a:r>
+              <a:rPr lang="en-US" dirty="0"/>
+              <a:t> </a:t>
+            </a:r>
+            <a:r>
+              <a:rPr lang="en-US" dirty="0" err="1"/>
+              <a:t>dan</a:t>
+            </a:r>
+            <a:r>
+              <a:rPr lang="en-US" dirty="0"/>
+              <a:t> </a:t>
+            </a:r>
+            <a:r>
+              <a:rPr lang="en-US" dirty="0" err="1"/>
+              <a:t>een</a:t>
+            </a:r>
+            <a:r>
+              <a:rPr lang="en-US" dirty="0"/>
+              <a:t> No Skill classifier.</a:t>
+            </a:r>
           </a:p>
         </p:txBody>
       </p:sp>
@@ -1653,7 +1933,90 @@
           <a:bodyPr/>
           <a:lstStyle/>
           <a:p>
-            <a:endParaRPr lang="en-US" dirty="0"/>
+            <a:r>
+              <a:rPr lang="en-US" dirty="0"/>
+              <a:t>Met de </a:t>
+            </a:r>
+            <a:r>
+              <a:rPr lang="en-US" dirty="0" err="1"/>
+              <a:t>aanpassingen</a:t>
+            </a:r>
+            <a:r>
+              <a:rPr lang="en-US" dirty="0"/>
+              <a:t> van </a:t>
+            </a:r>
+            <a:r>
+              <a:rPr lang="en-US" dirty="0" err="1"/>
+              <a:t>meneer</a:t>
+            </a:r>
+            <a:r>
+              <a:rPr lang="en-US" dirty="0"/>
+              <a:t> Dijk </a:t>
+            </a:r>
+            <a:r>
+              <a:rPr lang="en-US" dirty="0" err="1"/>
+              <a:t>lijkt</a:t>
+            </a:r>
+            <a:r>
+              <a:rPr lang="en-US" dirty="0"/>
+              <a:t> de </a:t>
+            </a:r>
+            <a:r>
+              <a:rPr lang="en-US" dirty="0" err="1"/>
+              <a:t>voorspeller</a:t>
+            </a:r>
+            <a:r>
+              <a:rPr lang="en-US" dirty="0"/>
+              <a:t> op de Lateral Movement stage </a:t>
+            </a:r>
+            <a:r>
+              <a:rPr lang="en-US" dirty="0" err="1"/>
+              <a:t>na</a:t>
+            </a:r>
+            <a:r>
+              <a:rPr lang="en-US" dirty="0"/>
+              <a:t> op </a:t>
+            </a:r>
+            <a:r>
+              <a:rPr lang="en-US" dirty="0" err="1"/>
+              <a:t>alle</a:t>
+            </a:r>
+            <a:r>
+              <a:rPr lang="en-US" dirty="0"/>
+              <a:t> </a:t>
+            </a:r>
+            <a:r>
+              <a:rPr lang="en-US" dirty="0" err="1"/>
+              <a:t>fronten</a:t>
+            </a:r>
+            <a:r>
+              <a:rPr lang="en-US" dirty="0"/>
+              <a:t> </a:t>
+            </a:r>
+            <a:r>
+              <a:rPr lang="en-US" dirty="0" err="1"/>
+              <a:t>beter</a:t>
+            </a:r>
+            <a:r>
+              <a:rPr lang="en-US" dirty="0"/>
+              <a:t> </a:t>
+            </a:r>
+            <a:r>
+              <a:rPr lang="en-US" dirty="0" err="1"/>
+              <a:t>te</a:t>
+            </a:r>
+            <a:r>
+              <a:rPr lang="en-US" dirty="0"/>
+              <a:t> </a:t>
+            </a:r>
+            <a:r>
+              <a:rPr lang="en-US" dirty="0" err="1"/>
+              <a:t>voorspellen</a:t>
+            </a:r>
+            <a:r>
+              <a:rPr lang="en-US" dirty="0"/>
+              <a:t>.</a:t>
+            </a:r>
           </a:p>
         </p:txBody>
       </p:sp>
@@ -2033,7 +2396,7 @@
     </p:spTree>
     <p:extLst>
       <p:ext uri="{BB962C8B-B14F-4D97-AF65-F5344CB8AC3E}">
-        <p14:creationId xmlns:p14="http://schemas.microsoft.com/office/powerpoint/2010/main" val="2369507233"/>
+        <p14:creationId xmlns:p14="http://schemas.microsoft.com/office/powerpoint/2010/main" val="3499438656"/>
       </p:ext>
     </p:extLst>
   </p:cSld>
@@ -5367,6 +5730,280 @@
           <p:cNvPr id="2" name="Title 1">
             <a:extLst>
               <a:ext uri="{FF2B5EF4-FFF2-40B4-BE49-F238E27FC236}">
+                <a16:creationId xmlns:a16="http://schemas.microsoft.com/office/drawing/2014/main" id="{C93C09F5-5F34-0E44-BEB3-A3FD11E05637}"/>
+              </a:ext>
+            </a:extLst>
+          </p:cNvPr>
+          <p:cNvSpPr>
+            <a:spLocks noGrp="1"/>
+          </p:cNvSpPr>
+          <p:nvPr>
+            <p:ph type="title"/>
+          </p:nvPr>
+        </p:nvSpPr>
+        <p:spPr/>
+        <p:txBody>
+          <a:bodyPr/>
+          <a:lstStyle/>
+          <a:p>
+            <a:r>
+              <a:rPr lang="en-US" dirty="0"/>
+              <a:t>Concept Development</a:t>
+            </a:r>
+          </a:p>
+        </p:txBody>
+      </p:sp>
+      <p:sp>
+        <p:nvSpPr>
+          <p:cNvPr id="4" name="Content Placeholder 3">
+            <a:extLst>
+              <a:ext uri="{FF2B5EF4-FFF2-40B4-BE49-F238E27FC236}">
+                <a16:creationId xmlns:a16="http://schemas.microsoft.com/office/drawing/2014/main" id="{0AEA1606-1804-7141-89C1-ABD563AEB5B1}"/>
+              </a:ext>
+            </a:extLst>
+          </p:cNvPr>
+          <p:cNvSpPr>
+            <a:spLocks noGrp="1"/>
+          </p:cNvSpPr>
+          <p:nvPr>
+            <p:ph sz="half" idx="1"/>
+          </p:nvPr>
+        </p:nvSpPr>
+        <p:spPr>
+          <a:xfrm>
+            <a:off x="838199" y="1825625"/>
+            <a:ext cx="4847897" cy="4351338"/>
+          </a:xfrm>
+        </p:spPr>
+        <p:txBody>
+          <a:bodyPr>
+            <a:normAutofit/>
+          </a:bodyPr>
+          <a:lstStyle/>
+          <a:p>
+            <a:endParaRPr lang="en-US" dirty="0"/>
+          </a:p>
+          <a:p>
+            <a:pPr marL="0" indent="0" algn="ctr">
+              <a:buNone/>
+            </a:pPr>
+            <a:r>
+              <a:rPr lang="en-US" b="1" i="1" dirty="0"/>
+              <a:t>Exploratory Data Analysis</a:t>
+            </a:r>
+            <a:r>
+              <a:rPr lang="en-US" dirty="0"/>
+              <a:t> is an approach of </a:t>
+            </a:r>
+            <a:r>
+              <a:rPr lang="en-US" b="1" dirty="0"/>
+              <a:t>analyzing data sets</a:t>
+            </a:r>
+            <a:r>
+              <a:rPr lang="en-US" dirty="0"/>
+              <a:t> to summarize their main characteristics, often using </a:t>
+            </a:r>
+            <a:r>
+              <a:rPr lang="en-US" b="1" dirty="0"/>
+              <a:t>statistical graphics</a:t>
+            </a:r>
+            <a:r>
+              <a:rPr lang="en-US" dirty="0"/>
+              <a:t> and other </a:t>
+            </a:r>
+            <a:r>
+              <a:rPr lang="en-US" b="1" dirty="0"/>
+              <a:t>data visualization </a:t>
+            </a:r>
+            <a:r>
+              <a:rPr lang="en-US" dirty="0"/>
+              <a:t>methods</a:t>
+            </a:r>
+          </a:p>
+        </p:txBody>
+      </p:sp>
+      <p:sp>
+        <p:nvSpPr>
+          <p:cNvPr id="5" name="Content Placeholder 4">
+            <a:extLst>
+              <a:ext uri="{FF2B5EF4-FFF2-40B4-BE49-F238E27FC236}">
+                <a16:creationId xmlns:a16="http://schemas.microsoft.com/office/drawing/2014/main" id="{1B59BAF3-1796-694D-8714-58D7D9F4CEAE}"/>
+              </a:ext>
+            </a:extLst>
+          </p:cNvPr>
+          <p:cNvSpPr>
+            <a:spLocks noGrp="1"/>
+          </p:cNvSpPr>
+          <p:nvPr>
+            <p:ph sz="half" idx="2"/>
+          </p:nvPr>
+        </p:nvSpPr>
+        <p:spPr>
+          <a:xfrm>
+            <a:off x="6505903" y="1825625"/>
+            <a:ext cx="4847898" cy="4351338"/>
+          </a:xfrm>
+        </p:spPr>
+        <p:txBody>
+          <a:bodyPr>
+            <a:normAutofit/>
+          </a:bodyPr>
+          <a:lstStyle/>
+          <a:p>
+            <a:pPr marL="0" indent="0">
+              <a:buNone/>
+            </a:pPr>
+            <a:endParaRPr lang="en-US" i="1" dirty="0"/>
+          </a:p>
+          <a:p>
+            <a:pPr marL="0" indent="0" algn="ctr">
+              <a:buNone/>
+            </a:pPr>
+            <a:r>
+              <a:rPr lang="en-US" b="1" i="1" dirty="0"/>
+              <a:t>Feature engineering</a:t>
+            </a:r>
+            <a:r>
+              <a:rPr lang="en-US" dirty="0"/>
+              <a:t> is the process of using </a:t>
+            </a:r>
+            <a:r>
+              <a:rPr lang="en-US" b="1" dirty="0"/>
+              <a:t>domain knowledge</a:t>
+            </a:r>
+            <a:r>
+              <a:rPr lang="en-US" dirty="0"/>
+              <a:t> to extract </a:t>
+            </a:r>
+            <a:r>
+              <a:rPr lang="en-US" b="1" dirty="0"/>
+              <a:t>features</a:t>
+            </a:r>
+            <a:r>
+              <a:rPr lang="en-US" dirty="0"/>
+              <a:t> (characteristics, properties, attributes) from raw data.</a:t>
+            </a:r>
+          </a:p>
+        </p:txBody>
+      </p:sp>
+    </p:spTree>
+    <p:extLst>
+      <p:ext uri="{BB962C8B-B14F-4D97-AF65-F5344CB8AC3E}">
+        <p14:creationId xmlns:p14="http://schemas.microsoft.com/office/powerpoint/2010/main" val="2696910812"/>
+      </p:ext>
+    </p:extLst>
+  </p:cSld>
+  <p:clrMapOvr>
+    <a:masterClrMapping/>
+  </p:clrMapOvr>
+</p:sld>
+</file>
+
+<file path=ppt/slides/slide11.xml><?xml version="1.0" encoding="utf-8"?>
+<p:sld xmlns:a="http://schemas.openxmlformats.org/drawingml/2006/main" xmlns:r="http://schemas.openxmlformats.org/officeDocument/2006/relationships" xmlns:p="http://schemas.openxmlformats.org/presentationml/2006/main">
+  <p:cSld>
+    <p:spTree>
+      <p:nvGrpSpPr>
+        <p:cNvPr id="1" name=""/>
+        <p:cNvGrpSpPr/>
+        <p:nvPr/>
+      </p:nvGrpSpPr>
+      <p:grpSpPr>
+        <a:xfrm>
+          <a:off x="0" y="0"/>
+          <a:ext cx="0" cy="0"/>
+          <a:chOff x="0" y="0"/>
+          <a:chExt cx="0" cy="0"/>
+        </a:xfrm>
+      </p:grpSpPr>
+      <p:sp>
+        <p:nvSpPr>
+          <p:cNvPr id="2" name="Title 1">
+            <a:extLst>
+              <a:ext uri="{FF2B5EF4-FFF2-40B4-BE49-F238E27FC236}">
+                <a16:creationId xmlns:a16="http://schemas.microsoft.com/office/drawing/2014/main" id="{145D160C-809A-EE4E-B8DC-0976BC90DA17}"/>
+              </a:ext>
+            </a:extLst>
+          </p:cNvPr>
+          <p:cNvSpPr>
+            <a:spLocks noGrp="1"/>
+          </p:cNvSpPr>
+          <p:nvPr>
+            <p:ph type="title"/>
+          </p:nvPr>
+        </p:nvSpPr>
+        <p:spPr/>
+        <p:txBody>
+          <a:bodyPr/>
+          <a:lstStyle/>
+          <a:p>
+            <a:r>
+              <a:rPr lang="en-US" dirty="0"/>
+              <a:t>Exploratory Data Analysis</a:t>
+            </a:r>
+          </a:p>
+        </p:txBody>
+      </p:sp>
+      <p:sp>
+        <p:nvSpPr>
+          <p:cNvPr id="5" name="Content Placeholder 4">
+            <a:extLst>
+              <a:ext uri="{FF2B5EF4-FFF2-40B4-BE49-F238E27FC236}">
+                <a16:creationId xmlns:a16="http://schemas.microsoft.com/office/drawing/2014/main" id="{BD178A67-FE83-4A45-A86D-4E2EB5F45B9E}"/>
+              </a:ext>
+            </a:extLst>
+          </p:cNvPr>
+          <p:cNvSpPr>
+            <a:spLocks noGrp="1"/>
+          </p:cNvSpPr>
+          <p:nvPr>
+            <p:ph idx="1"/>
+          </p:nvPr>
+        </p:nvSpPr>
+        <p:spPr/>
+        <p:txBody>
+          <a:bodyPr/>
+          <a:lstStyle/>
+          <a:p>
+            <a:endParaRPr lang="en-US"/>
+          </a:p>
+        </p:txBody>
+      </p:sp>
+    </p:spTree>
+    <p:extLst>
+      <p:ext uri="{BB962C8B-B14F-4D97-AF65-F5344CB8AC3E}">
+        <p14:creationId xmlns:p14="http://schemas.microsoft.com/office/powerpoint/2010/main" val="2355613091"/>
+      </p:ext>
+    </p:extLst>
+  </p:cSld>
+  <p:clrMapOvr>
+    <a:masterClrMapping/>
+  </p:clrMapOvr>
+</p:sld>
+</file>
+
+<file path=ppt/slides/slide12.xml><?xml version="1.0" encoding="utf-8"?>
+<p:sld xmlns:a="http://schemas.openxmlformats.org/drawingml/2006/main" xmlns:r="http://schemas.openxmlformats.org/officeDocument/2006/relationships" xmlns:p="http://schemas.openxmlformats.org/presentationml/2006/main">
+  <p:cSld>
+    <p:spTree>
+      <p:nvGrpSpPr>
+        <p:cNvPr id="1" name=""/>
+        <p:cNvGrpSpPr/>
+        <p:nvPr/>
+      </p:nvGrpSpPr>
+      <p:grpSpPr>
+        <a:xfrm>
+          <a:off x="0" y="0"/>
+          <a:ext cx="0" cy="0"/>
+          <a:chOff x="0" y="0"/>
+          <a:chExt cx="0" cy="0"/>
+        </a:xfrm>
+      </p:grpSpPr>
+      <p:sp>
+        <p:nvSpPr>
+          <p:cNvPr id="2" name="Title 1">
+            <a:extLst>
+              <a:ext uri="{FF2B5EF4-FFF2-40B4-BE49-F238E27FC236}">
                 <a16:creationId xmlns:a16="http://schemas.microsoft.com/office/drawing/2014/main" id="{AFA00B28-5FD0-7E4F-929D-7F8230478D1F}"/>
               </a:ext>
             </a:extLst>
@@ -5519,7 +6156,7 @@
 </p:sld>
 </file>
 
-<file path=ppt/slides/slide11.xml><?xml version="1.0" encoding="utf-8"?>
+<file path=ppt/slides/slide13.xml><?xml version="1.0" encoding="utf-8"?>
 <p:sld xmlns:a="http://schemas.openxmlformats.org/drawingml/2006/main" xmlns:r="http://schemas.openxmlformats.org/officeDocument/2006/relationships" xmlns:p="http://schemas.openxmlformats.org/presentationml/2006/main">
   <p:cSld>
     <p:spTree>
@@ -5781,7 +6418,7 @@
 </p:sld>
 </file>
 
-<file path=ppt/slides/slide12.xml><?xml version="1.0" encoding="utf-8"?>
+<file path=ppt/slides/slide14.xml><?xml version="1.0" encoding="utf-8"?>
 <p:sld xmlns:a="http://schemas.openxmlformats.org/drawingml/2006/main" xmlns:r="http://schemas.openxmlformats.org/officeDocument/2006/relationships" xmlns:p="http://schemas.openxmlformats.org/presentationml/2006/main">
   <p:cSld>
     <p:spTree>
@@ -6609,8 +7246,8 @@
           </a:prstGeom>
         </p:spPr>
       </p:pic>
-      <mc:AlternateContent xmlns:mc="http://schemas.openxmlformats.org/markup-compatibility/2006">
-        <mc:Choice xmlns:a14="http://schemas.microsoft.com/office/drawing/2010/main" Requires="a14">
+      <mc:AlternateContent xmlns:mc="http://schemas.openxmlformats.org/markup-compatibility/2006" xmlns:a14="http://schemas.microsoft.com/office/drawing/2010/main">
+        <mc:Choice Requires="a14">
           <p:sp>
             <p:nvSpPr>
               <p:cNvPr id="3" name="TextBox 2">
@@ -6639,6 +7276,7 @@
               </a:bodyPr>
               <a:lstStyle/>
               <a:p>
+                <a:pPr/>
                 <a14:m>
                   <m:oMathPara xmlns:m="http://schemas.openxmlformats.org/officeDocument/2006/math">
                     <m:oMathParaPr>
@@ -6690,7 +7328,7 @@
             </p:txBody>
           </p:sp>
         </mc:Choice>
-        <mc:Fallback>
+        <mc:Fallback xmlns="">
           <p:sp>
             <p:nvSpPr>
               <p:cNvPr id="3" name="TextBox 2">
@@ -6735,8 +7373,8 @@
           </p:sp>
         </mc:Fallback>
       </mc:AlternateContent>
-      <mc:AlternateContent xmlns:mc="http://schemas.openxmlformats.org/markup-compatibility/2006">
-        <mc:Choice xmlns:a14="http://schemas.microsoft.com/office/drawing/2010/main" Requires="a14">
+      <mc:AlternateContent xmlns:mc="http://schemas.openxmlformats.org/markup-compatibility/2006" xmlns:a14="http://schemas.microsoft.com/office/drawing/2010/main">
+        <mc:Choice Requires="a14">
           <p:sp>
             <p:nvSpPr>
               <p:cNvPr id="9" name="TextBox 8">
@@ -6765,6 +7403,7 @@
               </a:bodyPr>
               <a:lstStyle/>
               <a:p>
+                <a:pPr/>
                 <a14:m>
                   <m:oMathPara xmlns:m="http://schemas.openxmlformats.org/officeDocument/2006/math">
                     <m:oMathParaPr>
@@ -6816,7 +7455,7 @@
             </p:txBody>
           </p:sp>
         </mc:Choice>
-        <mc:Fallback>
+        <mc:Fallback xmlns="">
           <p:sp>
             <p:nvSpPr>
               <p:cNvPr id="9" name="TextBox 8">
@@ -7274,33 +7913,34 @@
               <a:rPr lang="en-US" dirty="0"/>
               <a:t>Is better prediction on lateral movement feasible?</a:t>
             </a:r>
-          </a:p>
-          <a:p>
-            <a:r>
-              <a:rPr lang="en-US" dirty="0"/>
-              <a:t>Should be conform</a:t>
+            <a:br>
+              <a:rPr lang="en-US" dirty="0"/>
+            </a:br>
+            <a:r>
+              <a:rPr lang="en-US" dirty="0"/>
+              <a:t>Better prediction should be possible conform</a:t>
             </a:r>
           </a:p>
           <a:p>
             <a:pPr lvl="1"/>
             <a:r>
-              <a:rPr lang="en-US" dirty="0"/>
-              <a:t>Using Deep Learning Model for Network Scanning Detection </a:t>
+              <a:rPr lang="en-US" sz="2000" dirty="0"/>
+              <a:t>Using Deep Learning Model for Network Scanning Detection [1]</a:t>
             </a:r>
           </a:p>
           <a:p>
             <a:pPr lvl="1"/>
             <a:r>
-              <a:rPr lang="en-US" dirty="0"/>
+              <a:rPr lang="en-US" sz="2000" dirty="0"/>
               <a:t>Efficient Classification of </a:t>
             </a:r>
             <a:r>
-              <a:rPr lang="en-US" dirty="0" err="1"/>
+              <a:rPr lang="en-US" sz="2000" dirty="0" err="1"/>
               <a:t>Portscan</a:t>
             </a:r>
             <a:r>
-              <a:rPr lang="en-US" dirty="0"/>
-              <a:t> Attacks using Support Vector Machine</a:t>
+              <a:rPr lang="en-US" sz="2000" dirty="0"/>
+              <a:t> Attacks using Support Vector Machine [2]</a:t>
             </a:r>
           </a:p>
           <a:p>

</xml_diff>